<commit_message>
Updated Flex Adapter docs to include switch config slide
</commit_message>
<xml_diff>
--- a/pcbs/Flex Adapter/Flex - Intan Adapter Board v2 Documentation.pptx
+++ b/pcbs/Flex Adapter/Flex - Intan Adapter Board v2 Documentation.pptx
@@ -12,7 +12,8 @@
     <p:sldId id="263" r:id="rId6"/>
     <p:sldId id="261" r:id="rId7"/>
     <p:sldId id="259" r:id="rId8"/>
-    <p:sldId id="258" r:id="rId9"/>
+    <p:sldId id="264" r:id="rId9"/>
+    <p:sldId id="258" r:id="rId10"/>
   </p:sldIdLst>
   <p:sldSz cx="12192000" cy="6858000"/>
   <p:notesSz cx="6858000" cy="9144000"/>
@@ -111,6 +112,11 @@
       </a:defRPr>
     </a:lvl9pPr>
   </p:defaultTextStyle>
+  <p:extLst>
+    <p:ext uri="{EFAFB233-063F-42B5-8137-9DF3F51BA10A}">
+      <p15:sldGuideLst xmlns:p15="http://schemas.microsoft.com/office/powerpoint/2012/main"/>
+    </p:ext>
+  </p:extLst>
 </p:presentation>
 </file>
 
@@ -159,7 +165,6 @@
               <a:rPr lang="en-US"/>
               <a:t>Click to edit Master title style</a:t>
             </a:r>
-            <a:endParaRPr lang="en-US"/>
           </a:p>
         </p:txBody>
       </p:sp>
@@ -224,7 +229,6 @@
               <a:rPr lang="en-US"/>
               <a:t>Click to edit Master subtitle style</a:t>
             </a:r>
-            <a:endParaRPr lang="en-US"/>
           </a:p>
         </p:txBody>
       </p:sp>
@@ -245,7 +249,7 @@
           <a:p>
             <a:fld id="{BAD80332-28EC-48C2-B5CB-601AEB033F99}" type="datetimeFigureOut">
               <a:rPr lang="en-US" smtClean="0"/>
-              <a:t>11/1/2016</a:t>
+              <a:t>1/13/2017</a:t>
             </a:fld>
             <a:endParaRPr lang="en-US"/>
           </a:p>
@@ -342,7 +346,6 @@
               <a:rPr lang="en-US"/>
               <a:t>Click to edit Master title style</a:t>
             </a:r>
-            <a:endParaRPr lang="en-US"/>
           </a:p>
         </p:txBody>
       </p:sp>
@@ -394,7 +397,6 @@
               <a:rPr lang="en-US"/>
               <a:t>Fifth level</a:t>
             </a:r>
-            <a:endParaRPr lang="en-US"/>
           </a:p>
         </p:txBody>
       </p:sp>
@@ -415,7 +417,7 @@
           <a:p>
             <a:fld id="{BAD80332-28EC-48C2-B5CB-601AEB033F99}" type="datetimeFigureOut">
               <a:rPr lang="en-US" smtClean="0"/>
-              <a:t>11/1/2016</a:t>
+              <a:t>1/13/2017</a:t>
             </a:fld>
             <a:endParaRPr lang="en-US"/>
           </a:p>
@@ -517,7 +519,6 @@
               <a:rPr lang="en-US"/>
               <a:t>Click to edit Master title style</a:t>
             </a:r>
-            <a:endParaRPr lang="en-US"/>
           </a:p>
         </p:txBody>
       </p:sp>
@@ -574,7 +575,6 @@
               <a:rPr lang="en-US"/>
               <a:t>Fifth level</a:t>
             </a:r>
-            <a:endParaRPr lang="en-US"/>
           </a:p>
         </p:txBody>
       </p:sp>
@@ -595,7 +595,7 @@
           <a:p>
             <a:fld id="{BAD80332-28EC-48C2-B5CB-601AEB033F99}" type="datetimeFigureOut">
               <a:rPr lang="en-US" smtClean="0"/>
-              <a:t>11/1/2016</a:t>
+              <a:t>1/13/2017</a:t>
             </a:fld>
             <a:endParaRPr lang="en-US"/>
           </a:p>
@@ -692,7 +692,6 @@
               <a:rPr lang="en-US"/>
               <a:t>Click to edit Master title style</a:t>
             </a:r>
-            <a:endParaRPr lang="en-US"/>
           </a:p>
         </p:txBody>
       </p:sp>
@@ -744,7 +743,6 @@
               <a:rPr lang="en-US"/>
               <a:t>Fifth level</a:t>
             </a:r>
-            <a:endParaRPr lang="en-US"/>
           </a:p>
         </p:txBody>
       </p:sp>
@@ -765,7 +763,7 @@
           <a:p>
             <a:fld id="{BAD80332-28EC-48C2-B5CB-601AEB033F99}" type="datetimeFigureOut">
               <a:rPr lang="en-US" smtClean="0"/>
-              <a:t>11/1/2016</a:t>
+              <a:t>1/13/2017</a:t>
             </a:fld>
             <a:endParaRPr lang="en-US"/>
           </a:p>
@@ -871,7 +869,6 @@
               <a:rPr lang="en-US"/>
               <a:t>Click to edit Master title style</a:t>
             </a:r>
-            <a:endParaRPr lang="en-US"/>
           </a:p>
         </p:txBody>
       </p:sp>
@@ -1011,7 +1008,7 @@
           <a:p>
             <a:fld id="{BAD80332-28EC-48C2-B5CB-601AEB033F99}" type="datetimeFigureOut">
               <a:rPr lang="en-US" smtClean="0"/>
-              <a:t>11/1/2016</a:t>
+              <a:t>1/13/2017</a:t>
             </a:fld>
             <a:endParaRPr lang="en-US"/>
           </a:p>
@@ -1108,7 +1105,6 @@
               <a:rPr lang="en-US"/>
               <a:t>Click to edit Master title style</a:t>
             </a:r>
-            <a:endParaRPr lang="en-US"/>
           </a:p>
         </p:txBody>
       </p:sp>
@@ -1165,7 +1161,6 @@
               <a:rPr lang="en-US"/>
               <a:t>Fifth level</a:t>
             </a:r>
-            <a:endParaRPr lang="en-US"/>
           </a:p>
         </p:txBody>
       </p:sp>
@@ -1222,7 +1217,6 @@
               <a:rPr lang="en-US"/>
               <a:t>Fifth level</a:t>
             </a:r>
-            <a:endParaRPr lang="en-US"/>
           </a:p>
         </p:txBody>
       </p:sp>
@@ -1243,7 +1237,7 @@
           <a:p>
             <a:fld id="{BAD80332-28EC-48C2-B5CB-601AEB033F99}" type="datetimeFigureOut">
               <a:rPr lang="en-US" smtClean="0"/>
-              <a:t>11/1/2016</a:t>
+              <a:t>1/13/2017</a:t>
             </a:fld>
             <a:endParaRPr lang="en-US"/>
           </a:p>
@@ -1345,7 +1339,6 @@
               <a:rPr lang="en-US"/>
               <a:t>Click to edit Master title style</a:t>
             </a:r>
-            <a:endParaRPr lang="en-US"/>
           </a:p>
         </p:txBody>
       </p:sp>
@@ -1467,7 +1460,6 @@
               <a:rPr lang="en-US"/>
               <a:t>Fifth level</a:t>
             </a:r>
-            <a:endParaRPr lang="en-US"/>
           </a:p>
         </p:txBody>
       </p:sp>
@@ -1589,7 +1581,6 @@
               <a:rPr lang="en-US"/>
               <a:t>Fifth level</a:t>
             </a:r>
-            <a:endParaRPr lang="en-US"/>
           </a:p>
         </p:txBody>
       </p:sp>
@@ -1610,7 +1601,7 @@
           <a:p>
             <a:fld id="{BAD80332-28EC-48C2-B5CB-601AEB033F99}" type="datetimeFigureOut">
               <a:rPr lang="en-US" smtClean="0"/>
-              <a:t>11/1/2016</a:t>
+              <a:t>1/13/2017</a:t>
             </a:fld>
             <a:endParaRPr lang="en-US"/>
           </a:p>
@@ -1707,7 +1698,6 @@
               <a:rPr lang="en-US"/>
               <a:t>Click to edit Master title style</a:t>
             </a:r>
-            <a:endParaRPr lang="en-US"/>
           </a:p>
         </p:txBody>
       </p:sp>
@@ -1728,7 +1718,7 @@
           <a:p>
             <a:fld id="{BAD80332-28EC-48C2-B5CB-601AEB033F99}" type="datetimeFigureOut">
               <a:rPr lang="en-US" smtClean="0"/>
-              <a:t>11/1/2016</a:t>
+              <a:t>1/13/2017</a:t>
             </a:fld>
             <a:endParaRPr lang="en-US"/>
           </a:p>
@@ -1823,7 +1813,7 @@
           <a:p>
             <a:fld id="{BAD80332-28EC-48C2-B5CB-601AEB033F99}" type="datetimeFigureOut">
               <a:rPr lang="en-US" smtClean="0"/>
-              <a:t>11/1/2016</a:t>
+              <a:t>1/13/2017</a:t>
             </a:fld>
             <a:endParaRPr lang="en-US"/>
           </a:p>
@@ -1929,7 +1919,6 @@
               <a:rPr lang="en-US"/>
               <a:t>Click to edit Master title style</a:t>
             </a:r>
-            <a:endParaRPr lang="en-US"/>
           </a:p>
         </p:txBody>
       </p:sp>
@@ -2014,7 +2003,6 @@
               <a:rPr lang="en-US"/>
               <a:t>Fifth level</a:t>
             </a:r>
-            <a:endParaRPr lang="en-US"/>
           </a:p>
         </p:txBody>
       </p:sp>
@@ -2100,7 +2088,7 @@
           <a:p>
             <a:fld id="{BAD80332-28EC-48C2-B5CB-601AEB033F99}" type="datetimeFigureOut">
               <a:rPr lang="en-US" smtClean="0"/>
-              <a:t>11/1/2016</a:t>
+              <a:t>1/13/2017</a:t>
             </a:fld>
             <a:endParaRPr lang="en-US"/>
           </a:p>
@@ -2206,7 +2194,6 @@
               <a:rPr lang="en-US"/>
               <a:t>Click to edit Master title style</a:t>
             </a:r>
-            <a:endParaRPr lang="en-US"/>
           </a:p>
         </p:txBody>
       </p:sp>
@@ -2353,7 +2340,7 @@
           <a:p>
             <a:fld id="{BAD80332-28EC-48C2-B5CB-601AEB033F99}" type="datetimeFigureOut">
               <a:rPr lang="en-US" smtClean="0"/>
-              <a:t>11/1/2016</a:t>
+              <a:t>1/13/2017</a:t>
             </a:fld>
             <a:endParaRPr lang="en-US"/>
           </a:p>
@@ -2465,7 +2452,6 @@
               <a:rPr lang="en-US"/>
               <a:t>Click to edit Master title style</a:t>
             </a:r>
-            <a:endParaRPr lang="en-US"/>
           </a:p>
         </p:txBody>
       </p:sp>
@@ -2527,7 +2513,6 @@
               <a:rPr lang="en-US"/>
               <a:t>Fifth level</a:t>
             </a:r>
-            <a:endParaRPr lang="en-US"/>
           </a:p>
         </p:txBody>
       </p:sp>
@@ -2566,7 +2551,7 @@
           <a:p>
             <a:fld id="{BAD80332-28EC-48C2-B5CB-601AEB033F99}" type="datetimeFigureOut">
               <a:rPr lang="en-US" smtClean="0"/>
-              <a:t>11/1/2016</a:t>
+              <a:t>1/13/2017</a:t>
             </a:fld>
             <a:endParaRPr lang="en-US"/>
           </a:p>
@@ -3009,9 +2994,10 @@
           <a:lstStyle/>
           <a:p>
             <a:r>
-              <a:rPr lang="en-US" dirty="0"/>
-              <a:t>Documentation v0</a:t>
-            </a:r>
+              <a:rPr lang="en-US"/>
+              <a:t>Documentation v1</a:t>
+            </a:r>
+            <a:endParaRPr lang="en-US" dirty="0"/>
           </a:p>
           <a:p>
             <a:r>
@@ -3022,7 +3008,7 @@
           <a:p>
             <a:r>
               <a:rPr lang="en-US" dirty="0"/>
-              <a:t>11/1/16</a:t>
+              <a:t>01/13/17</a:t>
             </a:r>
           </a:p>
         </p:txBody>
@@ -5800,7 +5786,7 @@
           <a:p>
             <a:r>
               <a:rPr lang="en-US" dirty="0"/>
-              <a:t>Typically, we short 2 channels to ref. </a:t>
+              <a:t>Typically, we short 2-4 channels to ref. </a:t>
             </a:r>
           </a:p>
           <a:p>
@@ -7149,6 +7135,1550 @@
 </file>
 
 <file path=ppt/slides/slide8.xml><?xml version="1.0" encoding="utf-8"?>
+<p:sld xmlns:a="http://schemas.openxmlformats.org/drawingml/2006/main" xmlns:r="http://schemas.openxmlformats.org/officeDocument/2006/relationships" xmlns:p="http://schemas.openxmlformats.org/presentationml/2006/main">
+  <p:cSld>
+    <p:spTree>
+      <p:nvGrpSpPr>
+        <p:cNvPr id="1" name=""/>
+        <p:cNvGrpSpPr/>
+        <p:nvPr/>
+      </p:nvGrpSpPr>
+      <p:grpSpPr>
+        <a:xfrm>
+          <a:off x="0" y="0"/>
+          <a:ext cx="0" cy="0"/>
+          <a:chOff x="0" y="0"/>
+          <a:chExt cx="0" cy="0"/>
+        </a:xfrm>
+      </p:grpSpPr>
+      <p:sp>
+        <p:nvSpPr>
+          <p:cNvPr id="2" name="Title 1"/>
+          <p:cNvSpPr>
+            <a:spLocks noGrp="1"/>
+          </p:cNvSpPr>
+          <p:nvPr>
+            <p:ph type="title"/>
+          </p:nvPr>
+        </p:nvSpPr>
+        <p:spPr>
+          <a:xfrm>
+            <a:off x="838200" y="365125"/>
+            <a:ext cx="10515600" cy="1325563"/>
+          </a:xfrm>
+        </p:spPr>
+        <p:txBody>
+          <a:bodyPr/>
+          <a:lstStyle/>
+          <a:p>
+            <a:r>
+              <a:rPr lang="en-US" dirty="0"/>
+              <a:t>Switches</a:t>
+            </a:r>
+          </a:p>
+        </p:txBody>
+      </p:sp>
+      <p:sp>
+        <p:nvSpPr>
+          <p:cNvPr id="3" name="Content Placeholder 2"/>
+          <p:cNvSpPr>
+            <a:spLocks noGrp="1"/>
+          </p:cNvSpPr>
+          <p:nvPr>
+            <p:ph idx="1"/>
+          </p:nvPr>
+        </p:nvSpPr>
+        <p:spPr>
+          <a:xfrm>
+            <a:off x="540325" y="1456833"/>
+            <a:ext cx="4887352" cy="879351"/>
+          </a:xfrm>
+        </p:spPr>
+        <p:txBody>
+          <a:bodyPr/>
+          <a:lstStyle/>
+          <a:p>
+            <a:pPr marL="0" indent="0">
+              <a:buNone/>
+            </a:pPr>
+            <a:r>
+              <a:rPr lang="en-US" b="1" dirty="0"/>
+              <a:t>Standard configuration switches prior to surgery:</a:t>
+            </a:r>
+          </a:p>
+        </p:txBody>
+      </p:sp>
+      <p:pic>
+        <p:nvPicPr>
+          <p:cNvPr id="4" name="Picture 3"/>
+          <p:cNvPicPr>
+            <a:picLocks noChangeAspect="1"/>
+          </p:cNvPicPr>
+          <p:nvPr/>
+        </p:nvPicPr>
+        <p:blipFill rotWithShape="1">
+          <a:blip r:embed="rId2">
+            <a:extLst>
+              <a:ext uri="{28A0092B-C50C-407E-A947-70E740481C1C}">
+                <a14:useLocalDpi xmlns:a14="http://schemas.microsoft.com/office/drawing/2010/main" val="0"/>
+              </a:ext>
+            </a:extLst>
+          </a:blip>
+          <a:srcRect l="30273" r="33771"/>
+          <a:stretch/>
+        </p:blipFill>
+        <p:spPr>
+          <a:xfrm>
+            <a:off x="7364459" y="1085899"/>
+            <a:ext cx="3356810" cy="5251393"/>
+          </a:xfrm>
+          <a:prstGeom prst="rect">
+            <a:avLst/>
+          </a:prstGeom>
+        </p:spPr>
+      </p:pic>
+      <p:sp>
+        <p:nvSpPr>
+          <p:cNvPr id="5" name="TextBox 4"/>
+          <p:cNvSpPr txBox="1"/>
+          <p:nvPr/>
+        </p:nvSpPr>
+        <p:spPr>
+          <a:xfrm>
+            <a:off x="8427247" y="365125"/>
+            <a:ext cx="2177717" cy="369332"/>
+          </a:xfrm>
+          <a:prstGeom prst="rect">
+            <a:avLst/>
+          </a:prstGeom>
+          <a:noFill/>
+        </p:spPr>
+        <p:txBody>
+          <a:bodyPr wrap="square" rtlCol="0">
+            <a:spAutoFit/>
+          </a:bodyPr>
+          <a:lstStyle/>
+          <a:p>
+            <a:r>
+              <a:rPr lang="en-US" dirty="0"/>
+              <a:t>Front Side</a:t>
+            </a:r>
+          </a:p>
+        </p:txBody>
+      </p:sp>
+      <p:sp>
+        <p:nvSpPr>
+          <p:cNvPr id="6" name="Rectangle 5"/>
+          <p:cNvSpPr/>
+          <p:nvPr/>
+        </p:nvSpPr>
+        <p:spPr>
+          <a:xfrm>
+            <a:off x="8531522" y="3434858"/>
+            <a:ext cx="753979" cy="681789"/>
+          </a:xfrm>
+          <a:prstGeom prst="rect">
+            <a:avLst/>
+          </a:prstGeom>
+          <a:noFill/>
+          <a:ln w="19050">
+            <a:solidFill>
+              <a:srgbClr val="ED7D31"/>
+            </a:solidFill>
+          </a:ln>
+        </p:spPr>
+        <p:style>
+          <a:lnRef idx="2">
+            <a:schemeClr val="accent1">
+              <a:shade val="50000"/>
+            </a:schemeClr>
+          </a:lnRef>
+          <a:fillRef idx="1">
+            <a:schemeClr val="accent1"/>
+          </a:fillRef>
+          <a:effectRef idx="0">
+            <a:schemeClr val="accent1"/>
+          </a:effectRef>
+          <a:fontRef idx="minor">
+            <a:schemeClr val="lt1"/>
+          </a:fontRef>
+        </p:style>
+        <p:txBody>
+          <a:bodyPr rtlCol="0" anchor="ctr"/>
+          <a:lstStyle/>
+          <a:p>
+            <a:pPr algn="ctr"/>
+            <a:endParaRPr lang="en-US"/>
+          </a:p>
+        </p:txBody>
+      </p:sp>
+      <p:cxnSp>
+        <p:nvCxnSpPr>
+          <p:cNvPr id="7" name="Straight Arrow Connector 6"/>
+          <p:cNvCxnSpPr/>
+          <p:nvPr/>
+        </p:nvCxnSpPr>
+        <p:spPr>
+          <a:xfrm flipH="1">
+            <a:off x="8898547" y="2960157"/>
+            <a:ext cx="1981442" cy="298980"/>
+          </a:xfrm>
+          <a:prstGeom prst="straightConnector1">
+            <a:avLst/>
+          </a:prstGeom>
+          <a:ln w="25400">
+            <a:tailEnd type="triangle"/>
+          </a:ln>
+        </p:spPr>
+        <p:style>
+          <a:lnRef idx="3">
+            <a:schemeClr val="accent2"/>
+          </a:lnRef>
+          <a:fillRef idx="0">
+            <a:schemeClr val="accent2"/>
+          </a:fillRef>
+          <a:effectRef idx="2">
+            <a:schemeClr val="accent2"/>
+          </a:effectRef>
+          <a:fontRef idx="minor">
+            <a:schemeClr val="tx1"/>
+          </a:fontRef>
+        </p:style>
+      </p:cxnSp>
+      <p:sp>
+        <p:nvSpPr>
+          <p:cNvPr id="8" name="TextBox 7"/>
+          <p:cNvSpPr txBox="1"/>
+          <p:nvPr/>
+        </p:nvSpPr>
+        <p:spPr>
+          <a:xfrm>
+            <a:off x="10879989" y="2696164"/>
+            <a:ext cx="1804250" cy="861774"/>
+          </a:xfrm>
+          <a:prstGeom prst="rect">
+            <a:avLst/>
+          </a:prstGeom>
+          <a:noFill/>
+        </p:spPr>
+        <p:txBody>
+          <a:bodyPr wrap="square" rtlCol="0">
+            <a:spAutoFit/>
+          </a:bodyPr>
+          <a:lstStyle/>
+          <a:p>
+            <a:r>
+              <a:rPr lang="en-US" sz="1600" dirty="0"/>
+              <a:t>Ref/</a:t>
+            </a:r>
+            <a:r>
+              <a:rPr lang="en-US" sz="1600" dirty="0" err="1"/>
+              <a:t>Gnd</a:t>
+            </a:r>
+            <a:endParaRPr lang="en-US" sz="1600" dirty="0"/>
+          </a:p>
+          <a:p>
+            <a:r>
+              <a:rPr lang="en-US" sz="1600" dirty="0"/>
+              <a:t>Group A</a:t>
+            </a:r>
+          </a:p>
+          <a:p>
+            <a:endParaRPr lang="en-US" sz="1600" dirty="0"/>
+          </a:p>
+        </p:txBody>
+      </p:sp>
+      <p:sp>
+        <p:nvSpPr>
+          <p:cNvPr id="9" name="Rectangle 8"/>
+          <p:cNvSpPr/>
+          <p:nvPr/>
+        </p:nvSpPr>
+        <p:spPr>
+          <a:xfrm>
+            <a:off x="8908511" y="4120523"/>
+            <a:ext cx="753979" cy="681789"/>
+          </a:xfrm>
+          <a:prstGeom prst="rect">
+            <a:avLst/>
+          </a:prstGeom>
+          <a:noFill/>
+          <a:ln w="19050">
+            <a:solidFill>
+              <a:srgbClr val="ED7D31"/>
+            </a:solidFill>
+          </a:ln>
+        </p:spPr>
+        <p:style>
+          <a:lnRef idx="2">
+            <a:schemeClr val="accent1">
+              <a:shade val="50000"/>
+            </a:schemeClr>
+          </a:lnRef>
+          <a:fillRef idx="1">
+            <a:schemeClr val="accent1"/>
+          </a:fillRef>
+          <a:effectRef idx="0">
+            <a:schemeClr val="accent1"/>
+          </a:effectRef>
+          <a:fontRef idx="minor">
+            <a:schemeClr val="lt1"/>
+          </a:fontRef>
+        </p:style>
+        <p:txBody>
+          <a:bodyPr rtlCol="0" anchor="ctr"/>
+          <a:lstStyle/>
+          <a:p>
+            <a:pPr algn="ctr"/>
+            <a:endParaRPr lang="en-US"/>
+          </a:p>
+        </p:txBody>
+      </p:sp>
+      <p:sp>
+        <p:nvSpPr>
+          <p:cNvPr id="10" name="Rectangle 9"/>
+          <p:cNvSpPr/>
+          <p:nvPr/>
+        </p:nvSpPr>
+        <p:spPr>
+          <a:xfrm>
+            <a:off x="8143109" y="4127194"/>
+            <a:ext cx="753979" cy="681789"/>
+          </a:xfrm>
+          <a:prstGeom prst="rect">
+            <a:avLst/>
+          </a:prstGeom>
+          <a:noFill/>
+          <a:ln w="19050">
+            <a:solidFill>
+              <a:srgbClr val="ED7D31"/>
+            </a:solidFill>
+          </a:ln>
+        </p:spPr>
+        <p:style>
+          <a:lnRef idx="2">
+            <a:schemeClr val="accent1">
+              <a:shade val="50000"/>
+            </a:schemeClr>
+          </a:lnRef>
+          <a:fillRef idx="1">
+            <a:schemeClr val="accent1"/>
+          </a:fillRef>
+          <a:effectRef idx="0">
+            <a:schemeClr val="accent1"/>
+          </a:effectRef>
+          <a:fontRef idx="minor">
+            <a:schemeClr val="lt1"/>
+          </a:fontRef>
+        </p:style>
+        <p:txBody>
+          <a:bodyPr rtlCol="0" anchor="ctr"/>
+          <a:lstStyle/>
+          <a:p>
+            <a:pPr algn="ctr"/>
+            <a:endParaRPr lang="en-US"/>
+          </a:p>
+        </p:txBody>
+      </p:sp>
+      <p:cxnSp>
+        <p:nvCxnSpPr>
+          <p:cNvPr id="11" name="Straight Arrow Connector 10"/>
+          <p:cNvCxnSpPr/>
+          <p:nvPr/>
+        </p:nvCxnSpPr>
+        <p:spPr>
+          <a:xfrm flipH="1">
+            <a:off x="9736260" y="4116647"/>
+            <a:ext cx="1239251" cy="160037"/>
+          </a:xfrm>
+          <a:prstGeom prst="straightConnector1">
+            <a:avLst/>
+          </a:prstGeom>
+          <a:ln w="25400">
+            <a:tailEnd type="triangle"/>
+          </a:ln>
+        </p:spPr>
+        <p:style>
+          <a:lnRef idx="3">
+            <a:schemeClr val="accent2"/>
+          </a:lnRef>
+          <a:fillRef idx="0">
+            <a:schemeClr val="accent2"/>
+          </a:fillRef>
+          <a:effectRef idx="2">
+            <a:schemeClr val="accent2"/>
+          </a:effectRef>
+          <a:fontRef idx="minor">
+            <a:schemeClr val="tx1"/>
+          </a:fontRef>
+        </p:style>
+      </p:cxnSp>
+      <p:sp>
+        <p:nvSpPr>
+          <p:cNvPr id="12" name="TextBox 11"/>
+          <p:cNvSpPr txBox="1"/>
+          <p:nvPr/>
+        </p:nvSpPr>
+        <p:spPr>
+          <a:xfrm>
+            <a:off x="10975511" y="3845797"/>
+            <a:ext cx="1804250" cy="830997"/>
+          </a:xfrm>
+          <a:prstGeom prst="rect">
+            <a:avLst/>
+          </a:prstGeom>
+          <a:noFill/>
+        </p:spPr>
+        <p:txBody>
+          <a:bodyPr wrap="square" rtlCol="0">
+            <a:spAutoFit/>
+          </a:bodyPr>
+          <a:lstStyle/>
+          <a:p>
+            <a:r>
+              <a:rPr lang="en-US" sz="1600" dirty="0"/>
+              <a:t>Ref/Channel </a:t>
+            </a:r>
+          </a:p>
+          <a:p>
+            <a:r>
+              <a:rPr lang="en-US" sz="1600" dirty="0"/>
+              <a:t>Group B</a:t>
+            </a:r>
+            <a:r>
+              <a:rPr lang="en-US" sz="1600" baseline="-25000" dirty="0"/>
+              <a:t>R</a:t>
+            </a:r>
+            <a:endParaRPr lang="en-US" sz="1600" dirty="0"/>
+          </a:p>
+          <a:p>
+            <a:endParaRPr lang="en-US" sz="1600" dirty="0"/>
+          </a:p>
+        </p:txBody>
+      </p:sp>
+      <p:cxnSp>
+        <p:nvCxnSpPr>
+          <p:cNvPr id="13" name="Straight Arrow Connector 12"/>
+          <p:cNvCxnSpPr/>
+          <p:nvPr/>
+        </p:nvCxnSpPr>
+        <p:spPr>
+          <a:xfrm flipH="1" flipV="1">
+            <a:off x="8755994" y="4835393"/>
+            <a:ext cx="2219517" cy="138764"/>
+          </a:xfrm>
+          <a:prstGeom prst="straightConnector1">
+            <a:avLst/>
+          </a:prstGeom>
+          <a:ln w="25400">
+            <a:tailEnd type="triangle"/>
+          </a:ln>
+        </p:spPr>
+        <p:style>
+          <a:lnRef idx="3">
+            <a:schemeClr val="accent2"/>
+          </a:lnRef>
+          <a:fillRef idx="0">
+            <a:schemeClr val="accent2"/>
+          </a:fillRef>
+          <a:effectRef idx="2">
+            <a:schemeClr val="accent2"/>
+          </a:effectRef>
+          <a:fontRef idx="minor">
+            <a:schemeClr val="tx1"/>
+          </a:fontRef>
+        </p:style>
+      </p:cxnSp>
+      <p:sp>
+        <p:nvSpPr>
+          <p:cNvPr id="16" name="TextBox 15"/>
+          <p:cNvSpPr txBox="1"/>
+          <p:nvPr/>
+        </p:nvSpPr>
+        <p:spPr>
+          <a:xfrm>
+            <a:off x="11012820" y="4802312"/>
+            <a:ext cx="1804250" cy="830997"/>
+          </a:xfrm>
+          <a:prstGeom prst="rect">
+            <a:avLst/>
+          </a:prstGeom>
+          <a:noFill/>
+        </p:spPr>
+        <p:txBody>
+          <a:bodyPr wrap="square" rtlCol="0">
+            <a:spAutoFit/>
+          </a:bodyPr>
+          <a:lstStyle/>
+          <a:p>
+            <a:r>
+              <a:rPr lang="en-US" sz="1600" dirty="0"/>
+              <a:t>Ref/Channel </a:t>
+            </a:r>
+          </a:p>
+          <a:p>
+            <a:r>
+              <a:rPr lang="en-US" sz="1600" dirty="0"/>
+              <a:t>Group B</a:t>
+            </a:r>
+            <a:r>
+              <a:rPr lang="en-US" sz="1600" baseline="-25000" dirty="0"/>
+              <a:t>L</a:t>
+            </a:r>
+            <a:endParaRPr lang="en-US" sz="1600" dirty="0"/>
+          </a:p>
+          <a:p>
+            <a:endParaRPr lang="en-US" sz="1600" dirty="0"/>
+          </a:p>
+        </p:txBody>
+      </p:sp>
+      <p:graphicFrame>
+        <p:nvGraphicFramePr>
+          <p:cNvPr id="19" name="Table 18"/>
+          <p:cNvGraphicFramePr>
+            <a:graphicFrameLocks noGrp="1"/>
+          </p:cNvGraphicFramePr>
+          <p:nvPr>
+            <p:extLst>
+              <p:ext uri="{D42A27DB-BD31-4B8C-83A1-F6EECF244321}">
+                <p14:modId xmlns:p14="http://schemas.microsoft.com/office/powerpoint/2010/main" val="7389139"/>
+              </p:ext>
+            </p:extLst>
+          </p:nvPr>
+        </p:nvGraphicFramePr>
+        <p:xfrm>
+          <a:off x="983954" y="2900444"/>
+          <a:ext cx="2603804" cy="1464116"/>
+        </p:xfrm>
+        <a:graphic>
+          <a:graphicData uri="http://schemas.openxmlformats.org/drawingml/2006/table">
+            <a:tbl>
+              <a:tblPr firstRow="1" bandRow="1">
+                <a:tableStyleId>{5C22544A-7EE6-4342-B048-85BDC9FD1C3A}</a:tableStyleId>
+              </a:tblPr>
+              <a:tblGrid>
+                <a:gridCol w="1301902">
+                  <a:extLst>
+                    <a:ext uri="{9D8B030D-6E8A-4147-A177-3AD203B41FA5}">
+                      <a16:colId xmlns:a16="http://schemas.microsoft.com/office/drawing/2014/main" val="3306530282"/>
+                    </a:ext>
+                  </a:extLst>
+                </a:gridCol>
+                <a:gridCol w="1301902">
+                  <a:extLst>
+                    <a:ext uri="{9D8B030D-6E8A-4147-A177-3AD203B41FA5}">
+                      <a16:colId xmlns:a16="http://schemas.microsoft.com/office/drawing/2014/main" val="4111062305"/>
+                    </a:ext>
+                  </a:extLst>
+                </a:gridCol>
+              </a:tblGrid>
+              <a:tr h="366029">
+                <a:tc>
+                  <a:txBody>
+                    <a:bodyPr/>
+                    <a:lstStyle/>
+                    <a:p>
+                      <a:r>
+                        <a:rPr lang="en-US" sz="1600" dirty="0"/>
+                        <a:t>Switch</a:t>
+                      </a:r>
+                    </a:p>
+                  </a:txBody>
+                  <a:tcPr/>
+                </a:tc>
+                <a:tc>
+                  <a:txBody>
+                    <a:bodyPr/>
+                    <a:lstStyle/>
+                    <a:p>
+                      <a:r>
+                        <a:rPr lang="en-US" sz="1600" dirty="0"/>
+                        <a:t>Position</a:t>
+                      </a:r>
+                    </a:p>
+                  </a:txBody>
+                  <a:tcPr/>
+                </a:tc>
+                <a:extLst>
+                  <a:ext uri="{0D108BD9-81ED-4DB2-BD59-A6C34878D82A}">
+                    <a16:rowId xmlns:a16="http://schemas.microsoft.com/office/drawing/2014/main" val="4070999709"/>
+                  </a:ext>
+                </a:extLst>
+              </a:tr>
+              <a:tr h="366029">
+                <a:tc>
+                  <a:txBody>
+                    <a:bodyPr/>
+                    <a:lstStyle/>
+                    <a:p>
+                      <a:r>
+                        <a:rPr lang="en-US" sz="1600" dirty="0"/>
+                        <a:t>1 (Left)</a:t>
+                      </a:r>
+                    </a:p>
+                  </a:txBody>
+                  <a:tcPr/>
+                </a:tc>
+                <a:tc>
+                  <a:txBody>
+                    <a:bodyPr/>
+                    <a:lstStyle/>
+                    <a:p>
+                      <a:r>
+                        <a:rPr lang="en-US" sz="1600" dirty="0"/>
+                        <a:t>Open</a:t>
+                      </a:r>
+                    </a:p>
+                  </a:txBody>
+                  <a:tcPr/>
+                </a:tc>
+                <a:extLst>
+                  <a:ext uri="{0D108BD9-81ED-4DB2-BD59-A6C34878D82A}">
+                    <a16:rowId xmlns:a16="http://schemas.microsoft.com/office/drawing/2014/main" val="3613914943"/>
+                  </a:ext>
+                </a:extLst>
+              </a:tr>
+              <a:tr h="366029">
+                <a:tc>
+                  <a:txBody>
+                    <a:bodyPr/>
+                    <a:lstStyle/>
+                    <a:p>
+                      <a:r>
+                        <a:rPr lang="en-US" sz="1600" dirty="0"/>
+                        <a:t>2 (Middle)</a:t>
+                      </a:r>
+                    </a:p>
+                  </a:txBody>
+                  <a:tcPr/>
+                </a:tc>
+                <a:tc>
+                  <a:txBody>
+                    <a:bodyPr/>
+                    <a:lstStyle/>
+                    <a:p>
+                      <a:r>
+                        <a:rPr lang="en-US" sz="1600" b="1" dirty="0"/>
+                        <a:t>Close</a:t>
+                      </a:r>
+                    </a:p>
+                  </a:txBody>
+                  <a:tcPr/>
+                </a:tc>
+                <a:extLst>
+                  <a:ext uri="{0D108BD9-81ED-4DB2-BD59-A6C34878D82A}">
+                    <a16:rowId xmlns:a16="http://schemas.microsoft.com/office/drawing/2014/main" val="2436994691"/>
+                  </a:ext>
+                </a:extLst>
+              </a:tr>
+              <a:tr h="366029">
+                <a:tc>
+                  <a:txBody>
+                    <a:bodyPr/>
+                    <a:lstStyle/>
+                    <a:p>
+                      <a:r>
+                        <a:rPr lang="en-US" sz="1600" dirty="0"/>
+                        <a:t>3 (Right)</a:t>
+                      </a:r>
+                    </a:p>
+                  </a:txBody>
+                  <a:tcPr/>
+                </a:tc>
+                <a:tc>
+                  <a:txBody>
+                    <a:bodyPr/>
+                    <a:lstStyle/>
+                    <a:p>
+                      <a:r>
+                        <a:rPr lang="en-US" sz="1600" dirty="0"/>
+                        <a:t>Open</a:t>
+                      </a:r>
+                    </a:p>
+                  </a:txBody>
+                  <a:tcPr/>
+                </a:tc>
+                <a:extLst>
+                  <a:ext uri="{0D108BD9-81ED-4DB2-BD59-A6C34878D82A}">
+                    <a16:rowId xmlns:a16="http://schemas.microsoft.com/office/drawing/2014/main" val="3115724806"/>
+                  </a:ext>
+                </a:extLst>
+              </a:tr>
+            </a:tbl>
+          </a:graphicData>
+        </a:graphic>
+      </p:graphicFrame>
+      <p:sp>
+        <p:nvSpPr>
+          <p:cNvPr id="20" name="TextBox 19"/>
+          <p:cNvSpPr txBox="1"/>
+          <p:nvPr/>
+        </p:nvSpPr>
+        <p:spPr>
+          <a:xfrm>
+            <a:off x="3892869" y="3207984"/>
+            <a:ext cx="2997018" cy="923330"/>
+          </a:xfrm>
+          <a:prstGeom prst="rect">
+            <a:avLst/>
+          </a:prstGeom>
+          <a:noFill/>
+        </p:spPr>
+        <p:txBody>
+          <a:bodyPr wrap="square" rtlCol="0">
+            <a:spAutoFit/>
+          </a:bodyPr>
+          <a:lstStyle/>
+          <a:p>
+            <a:r>
+              <a:rPr lang="en-US" dirty="0"/>
+              <a:t>Closed switches are highlighted in </a:t>
+            </a:r>
+            <a:r>
+              <a:rPr lang="en-US" dirty="0">
+                <a:solidFill>
+                  <a:srgbClr val="ED7D31"/>
+                </a:solidFill>
+              </a:rPr>
+              <a:t>orange</a:t>
+            </a:r>
+            <a:r>
+              <a:rPr lang="en-US" dirty="0"/>
+              <a:t> in the figure to the right</a:t>
+            </a:r>
+          </a:p>
+        </p:txBody>
+      </p:sp>
+      <p:sp>
+        <p:nvSpPr>
+          <p:cNvPr id="21" name="TextBox 20"/>
+          <p:cNvSpPr txBox="1"/>
+          <p:nvPr/>
+        </p:nvSpPr>
+        <p:spPr>
+          <a:xfrm>
+            <a:off x="1275932" y="2463316"/>
+            <a:ext cx="3063373" cy="646331"/>
+          </a:xfrm>
+          <a:prstGeom prst="rect">
+            <a:avLst/>
+          </a:prstGeom>
+          <a:noFill/>
+        </p:spPr>
+        <p:txBody>
+          <a:bodyPr wrap="square" rtlCol="0">
+            <a:spAutoFit/>
+          </a:bodyPr>
+          <a:lstStyle/>
+          <a:p>
+            <a:r>
+              <a:rPr lang="en-US" b="1" dirty="0"/>
+              <a:t>Ref/</a:t>
+            </a:r>
+            <a:r>
+              <a:rPr lang="en-US" b="1" dirty="0" err="1"/>
+              <a:t>Gnd</a:t>
+            </a:r>
+            <a:r>
+              <a:rPr lang="en-US" b="1" dirty="0"/>
+              <a:t>: Group A</a:t>
+            </a:r>
+          </a:p>
+          <a:p>
+            <a:endParaRPr lang="en-US" b="1" dirty="0"/>
+          </a:p>
+        </p:txBody>
+      </p:sp>
+      <p:graphicFrame>
+        <p:nvGraphicFramePr>
+          <p:cNvPr id="22" name="Table 21"/>
+          <p:cNvGraphicFramePr>
+            <a:graphicFrameLocks noGrp="1"/>
+          </p:cNvGraphicFramePr>
+          <p:nvPr>
+            <p:extLst>
+              <p:ext uri="{D42A27DB-BD31-4B8C-83A1-F6EECF244321}">
+                <p14:modId xmlns:p14="http://schemas.microsoft.com/office/powerpoint/2010/main" val="3678597869"/>
+              </p:ext>
+            </p:extLst>
+          </p:nvPr>
+        </p:nvGraphicFramePr>
+        <p:xfrm>
+          <a:off x="436228" y="5010056"/>
+          <a:ext cx="3154994" cy="1830145"/>
+        </p:xfrm>
+        <a:graphic>
+          <a:graphicData uri="http://schemas.openxmlformats.org/drawingml/2006/table">
+            <a:tbl>
+              <a:tblPr firstRow="1" bandRow="1">
+                <a:tableStyleId>{5C22544A-7EE6-4342-B048-85BDC9FD1C3A}</a:tableStyleId>
+              </a:tblPr>
+              <a:tblGrid>
+                <a:gridCol w="1793304">
+                  <a:extLst>
+                    <a:ext uri="{9D8B030D-6E8A-4147-A177-3AD203B41FA5}">
+                      <a16:colId xmlns:a16="http://schemas.microsoft.com/office/drawing/2014/main" val="3306530282"/>
+                    </a:ext>
+                  </a:extLst>
+                </a:gridCol>
+                <a:gridCol w="1361690">
+                  <a:extLst>
+                    <a:ext uri="{9D8B030D-6E8A-4147-A177-3AD203B41FA5}">
+                      <a16:colId xmlns:a16="http://schemas.microsoft.com/office/drawing/2014/main" val="4111062305"/>
+                    </a:ext>
+                  </a:extLst>
+                </a:gridCol>
+              </a:tblGrid>
+              <a:tr h="366029">
+                <a:tc>
+                  <a:txBody>
+                    <a:bodyPr/>
+                    <a:lstStyle/>
+                    <a:p>
+                      <a:r>
+                        <a:rPr lang="en-US" sz="1600" dirty="0"/>
+                        <a:t>Switch</a:t>
+                      </a:r>
+                    </a:p>
+                  </a:txBody>
+                  <a:tcPr/>
+                </a:tc>
+                <a:tc>
+                  <a:txBody>
+                    <a:bodyPr/>
+                    <a:lstStyle/>
+                    <a:p>
+                      <a:r>
+                        <a:rPr lang="en-US" sz="1600" dirty="0"/>
+                        <a:t>Position</a:t>
+                      </a:r>
+                    </a:p>
+                  </a:txBody>
+                  <a:tcPr/>
+                </a:tc>
+                <a:extLst>
+                  <a:ext uri="{0D108BD9-81ED-4DB2-BD59-A6C34878D82A}">
+                    <a16:rowId xmlns:a16="http://schemas.microsoft.com/office/drawing/2014/main" val="4070999709"/>
+                  </a:ext>
+                </a:extLst>
+              </a:tr>
+              <a:tr h="366029">
+                <a:tc>
+                  <a:txBody>
+                    <a:bodyPr/>
+                    <a:lstStyle/>
+                    <a:p>
+                      <a:r>
+                        <a:rPr lang="en-US" sz="1600" dirty="0"/>
+                        <a:t>1 (Bottom)</a:t>
+                      </a:r>
+                    </a:p>
+                  </a:txBody>
+                  <a:tcPr/>
+                </a:tc>
+                <a:tc>
+                  <a:txBody>
+                    <a:bodyPr/>
+                    <a:lstStyle/>
+                    <a:p>
+                      <a:r>
+                        <a:rPr lang="en-US" sz="1600" b="1" dirty="0"/>
+                        <a:t>Close</a:t>
+                      </a:r>
+                    </a:p>
+                  </a:txBody>
+                  <a:tcPr/>
+                </a:tc>
+                <a:extLst>
+                  <a:ext uri="{0D108BD9-81ED-4DB2-BD59-A6C34878D82A}">
+                    <a16:rowId xmlns:a16="http://schemas.microsoft.com/office/drawing/2014/main" val="3613914943"/>
+                  </a:ext>
+                </a:extLst>
+              </a:tr>
+              <a:tr h="366029">
+                <a:tc>
+                  <a:txBody>
+                    <a:bodyPr/>
+                    <a:lstStyle/>
+                    <a:p>
+                      <a:r>
+                        <a:rPr lang="en-US" sz="1600" dirty="0"/>
+                        <a:t>2 (Bot</a:t>
+                      </a:r>
+                      <a:r>
+                        <a:rPr lang="en-US" sz="1600" baseline="0" dirty="0"/>
+                        <a:t>tom Mid</a:t>
+                      </a:r>
+                      <a:r>
+                        <a:rPr lang="en-US" sz="1600" dirty="0"/>
+                        <a:t>)</a:t>
+                      </a:r>
+                    </a:p>
+                  </a:txBody>
+                  <a:tcPr/>
+                </a:tc>
+                <a:tc>
+                  <a:txBody>
+                    <a:bodyPr/>
+                    <a:lstStyle/>
+                    <a:p>
+                      <a:r>
+                        <a:rPr lang="en-US" sz="1600" dirty="0"/>
+                        <a:t>Open or </a:t>
+                      </a:r>
+                      <a:r>
+                        <a:rPr lang="en-US" sz="1600" b="1" dirty="0"/>
+                        <a:t>Close</a:t>
+                      </a:r>
+                    </a:p>
+                  </a:txBody>
+                  <a:tcPr/>
+                </a:tc>
+                <a:extLst>
+                  <a:ext uri="{0D108BD9-81ED-4DB2-BD59-A6C34878D82A}">
+                    <a16:rowId xmlns:a16="http://schemas.microsoft.com/office/drawing/2014/main" val="2436994691"/>
+                  </a:ext>
+                </a:extLst>
+              </a:tr>
+              <a:tr h="366029">
+                <a:tc>
+                  <a:txBody>
+                    <a:bodyPr/>
+                    <a:lstStyle/>
+                    <a:p>
+                      <a:r>
+                        <a:rPr lang="en-US" sz="1600" dirty="0"/>
+                        <a:t>3 (Top Mid)</a:t>
+                      </a:r>
+                    </a:p>
+                  </a:txBody>
+                  <a:tcPr/>
+                </a:tc>
+                <a:tc>
+                  <a:txBody>
+                    <a:bodyPr/>
+                    <a:lstStyle/>
+                    <a:p>
+                      <a:r>
+                        <a:rPr lang="en-US" sz="1600" dirty="0"/>
+                        <a:t>Open</a:t>
+                      </a:r>
+                    </a:p>
+                  </a:txBody>
+                  <a:tcPr/>
+                </a:tc>
+                <a:extLst>
+                  <a:ext uri="{0D108BD9-81ED-4DB2-BD59-A6C34878D82A}">
+                    <a16:rowId xmlns:a16="http://schemas.microsoft.com/office/drawing/2014/main" val="3115724806"/>
+                  </a:ext>
+                </a:extLst>
+              </a:tr>
+              <a:tr h="366029">
+                <a:tc>
+                  <a:txBody>
+                    <a:bodyPr/>
+                    <a:lstStyle/>
+                    <a:p>
+                      <a:r>
+                        <a:rPr lang="en-US" sz="1600" dirty="0"/>
+                        <a:t>4 (Top)</a:t>
+                      </a:r>
+                    </a:p>
+                  </a:txBody>
+                  <a:tcPr/>
+                </a:tc>
+                <a:tc>
+                  <a:txBody>
+                    <a:bodyPr/>
+                    <a:lstStyle/>
+                    <a:p>
+                      <a:r>
+                        <a:rPr lang="en-US" sz="1600" dirty="0"/>
+                        <a:t>Open</a:t>
+                      </a:r>
+                    </a:p>
+                  </a:txBody>
+                  <a:tcPr/>
+                </a:tc>
+                <a:extLst>
+                  <a:ext uri="{0D108BD9-81ED-4DB2-BD59-A6C34878D82A}">
+                    <a16:rowId xmlns:a16="http://schemas.microsoft.com/office/drawing/2014/main" val="2072985386"/>
+                  </a:ext>
+                </a:extLst>
+              </a:tr>
+            </a:tbl>
+          </a:graphicData>
+        </a:graphic>
+      </p:graphicFrame>
+      <p:graphicFrame>
+        <p:nvGraphicFramePr>
+          <p:cNvPr id="23" name="Table 22"/>
+          <p:cNvGraphicFramePr>
+            <a:graphicFrameLocks noGrp="1"/>
+          </p:cNvGraphicFramePr>
+          <p:nvPr>
+            <p:extLst>
+              <p:ext uri="{D42A27DB-BD31-4B8C-83A1-F6EECF244321}">
+                <p14:modId xmlns:p14="http://schemas.microsoft.com/office/powerpoint/2010/main" val="1010115983"/>
+              </p:ext>
+            </p:extLst>
+          </p:nvPr>
+        </p:nvGraphicFramePr>
+        <p:xfrm>
+          <a:off x="3752707" y="5027855"/>
+          <a:ext cx="3184988" cy="1830145"/>
+        </p:xfrm>
+        <a:graphic>
+          <a:graphicData uri="http://schemas.openxmlformats.org/drawingml/2006/table">
+            <a:tbl>
+              <a:tblPr firstRow="1" bandRow="1">
+                <a:tableStyleId>{5C22544A-7EE6-4342-B048-85BDC9FD1C3A}</a:tableStyleId>
+              </a:tblPr>
+              <a:tblGrid>
+                <a:gridCol w="1810352">
+                  <a:extLst>
+                    <a:ext uri="{9D8B030D-6E8A-4147-A177-3AD203B41FA5}">
+                      <a16:colId xmlns:a16="http://schemas.microsoft.com/office/drawing/2014/main" val="3306530282"/>
+                    </a:ext>
+                  </a:extLst>
+                </a:gridCol>
+                <a:gridCol w="1374636">
+                  <a:extLst>
+                    <a:ext uri="{9D8B030D-6E8A-4147-A177-3AD203B41FA5}">
+                      <a16:colId xmlns:a16="http://schemas.microsoft.com/office/drawing/2014/main" val="4111062305"/>
+                    </a:ext>
+                  </a:extLst>
+                </a:gridCol>
+              </a:tblGrid>
+              <a:tr h="366029">
+                <a:tc>
+                  <a:txBody>
+                    <a:bodyPr/>
+                    <a:lstStyle/>
+                    <a:p>
+                      <a:r>
+                        <a:rPr lang="en-US" sz="1600" dirty="0"/>
+                        <a:t>Switch</a:t>
+                      </a:r>
+                    </a:p>
+                  </a:txBody>
+                  <a:tcPr/>
+                </a:tc>
+                <a:tc>
+                  <a:txBody>
+                    <a:bodyPr/>
+                    <a:lstStyle/>
+                    <a:p>
+                      <a:r>
+                        <a:rPr lang="en-US" sz="1600" dirty="0"/>
+                        <a:t>Position</a:t>
+                      </a:r>
+                    </a:p>
+                  </a:txBody>
+                  <a:tcPr/>
+                </a:tc>
+                <a:extLst>
+                  <a:ext uri="{0D108BD9-81ED-4DB2-BD59-A6C34878D82A}">
+                    <a16:rowId xmlns:a16="http://schemas.microsoft.com/office/drawing/2014/main" val="4070999709"/>
+                  </a:ext>
+                </a:extLst>
+              </a:tr>
+              <a:tr h="366029">
+                <a:tc>
+                  <a:txBody>
+                    <a:bodyPr/>
+                    <a:lstStyle/>
+                    <a:p>
+                      <a:r>
+                        <a:rPr lang="en-US" sz="1600" dirty="0"/>
+                        <a:t>1 (Top)</a:t>
+                      </a:r>
+                    </a:p>
+                  </a:txBody>
+                  <a:tcPr/>
+                </a:tc>
+                <a:tc>
+                  <a:txBody>
+                    <a:bodyPr/>
+                    <a:lstStyle/>
+                    <a:p>
+                      <a:r>
+                        <a:rPr lang="en-US" sz="1600" dirty="0"/>
+                        <a:t>Open</a:t>
+                      </a:r>
+                      <a:endParaRPr lang="en-US" sz="1600" b="1" i="1" dirty="0"/>
+                    </a:p>
+                  </a:txBody>
+                  <a:tcPr/>
+                </a:tc>
+                <a:extLst>
+                  <a:ext uri="{0D108BD9-81ED-4DB2-BD59-A6C34878D82A}">
+                    <a16:rowId xmlns:a16="http://schemas.microsoft.com/office/drawing/2014/main" val="3613914943"/>
+                  </a:ext>
+                </a:extLst>
+              </a:tr>
+              <a:tr h="366029">
+                <a:tc>
+                  <a:txBody>
+                    <a:bodyPr/>
+                    <a:lstStyle/>
+                    <a:p>
+                      <a:r>
+                        <a:rPr lang="en-US" sz="1600" dirty="0"/>
+                        <a:t>2 (Top</a:t>
+                      </a:r>
+                      <a:r>
+                        <a:rPr lang="en-US" sz="1600" baseline="0" dirty="0"/>
+                        <a:t> Mid</a:t>
+                      </a:r>
+                      <a:r>
+                        <a:rPr lang="en-US" sz="1600" dirty="0"/>
+                        <a:t>)</a:t>
+                      </a:r>
+                    </a:p>
+                  </a:txBody>
+                  <a:tcPr/>
+                </a:tc>
+                <a:tc>
+                  <a:txBody>
+                    <a:bodyPr/>
+                    <a:lstStyle/>
+                    <a:p>
+                      <a:r>
+                        <a:rPr lang="en-US" sz="1600" dirty="0"/>
+                        <a:t>Open</a:t>
+                      </a:r>
+                      <a:endParaRPr lang="en-US" sz="1600" b="1" i="1" dirty="0"/>
+                    </a:p>
+                  </a:txBody>
+                  <a:tcPr/>
+                </a:tc>
+                <a:extLst>
+                  <a:ext uri="{0D108BD9-81ED-4DB2-BD59-A6C34878D82A}">
+                    <a16:rowId xmlns:a16="http://schemas.microsoft.com/office/drawing/2014/main" val="2436994691"/>
+                  </a:ext>
+                </a:extLst>
+              </a:tr>
+              <a:tr h="366029">
+                <a:tc>
+                  <a:txBody>
+                    <a:bodyPr/>
+                    <a:lstStyle/>
+                    <a:p>
+                      <a:r>
+                        <a:rPr lang="en-US" sz="1600" dirty="0"/>
+                        <a:t>3 (Bottom Mid)</a:t>
+                      </a:r>
+                    </a:p>
+                  </a:txBody>
+                  <a:tcPr/>
+                </a:tc>
+                <a:tc>
+                  <a:txBody>
+                    <a:bodyPr/>
+                    <a:lstStyle/>
+                    <a:p>
+                      <a:r>
+                        <a:rPr lang="en-US" sz="1600" dirty="0"/>
+                        <a:t>Open or </a:t>
+                      </a:r>
+                      <a:r>
+                        <a:rPr lang="en-US" sz="1600" b="1" dirty="0"/>
+                        <a:t>Close</a:t>
+                      </a:r>
+                      <a:endParaRPr lang="en-US" sz="1600" b="1" i="1" dirty="0"/>
+                    </a:p>
+                  </a:txBody>
+                  <a:tcPr/>
+                </a:tc>
+                <a:extLst>
+                  <a:ext uri="{0D108BD9-81ED-4DB2-BD59-A6C34878D82A}">
+                    <a16:rowId xmlns:a16="http://schemas.microsoft.com/office/drawing/2014/main" val="3115724806"/>
+                  </a:ext>
+                </a:extLst>
+              </a:tr>
+              <a:tr h="366029">
+                <a:tc>
+                  <a:txBody>
+                    <a:bodyPr/>
+                    <a:lstStyle/>
+                    <a:p>
+                      <a:r>
+                        <a:rPr lang="en-US" sz="1600" dirty="0"/>
+                        <a:t>4 (Bottom)</a:t>
+                      </a:r>
+                    </a:p>
+                  </a:txBody>
+                  <a:tcPr/>
+                </a:tc>
+                <a:tc>
+                  <a:txBody>
+                    <a:bodyPr/>
+                    <a:lstStyle/>
+                    <a:p>
+                      <a:r>
+                        <a:rPr lang="en-US" sz="1600" b="1" dirty="0"/>
+                        <a:t>Close</a:t>
+                      </a:r>
+                      <a:endParaRPr lang="en-US" sz="1600" b="1" i="1" dirty="0"/>
+                    </a:p>
+                  </a:txBody>
+                  <a:tcPr/>
+                </a:tc>
+                <a:extLst>
+                  <a:ext uri="{0D108BD9-81ED-4DB2-BD59-A6C34878D82A}">
+                    <a16:rowId xmlns:a16="http://schemas.microsoft.com/office/drawing/2014/main" val="2072985386"/>
+                  </a:ext>
+                </a:extLst>
+              </a:tr>
+            </a:tbl>
+          </a:graphicData>
+        </a:graphic>
+      </p:graphicFrame>
+      <p:sp>
+        <p:nvSpPr>
+          <p:cNvPr id="24" name="TextBox 23"/>
+          <p:cNvSpPr txBox="1"/>
+          <p:nvPr/>
+        </p:nvSpPr>
+        <p:spPr>
+          <a:xfrm>
+            <a:off x="1209191" y="4581609"/>
+            <a:ext cx="3063373" cy="646331"/>
+          </a:xfrm>
+          <a:prstGeom prst="rect">
+            <a:avLst/>
+          </a:prstGeom>
+          <a:noFill/>
+        </p:spPr>
+        <p:txBody>
+          <a:bodyPr wrap="square" rtlCol="0">
+            <a:spAutoFit/>
+          </a:bodyPr>
+          <a:lstStyle/>
+          <a:p>
+            <a:r>
+              <a:rPr lang="en-US" b="1" dirty="0"/>
+              <a:t>Ref/</a:t>
+            </a:r>
+            <a:r>
+              <a:rPr lang="en-US" b="1" dirty="0" err="1"/>
+              <a:t>Gnd</a:t>
+            </a:r>
+            <a:r>
+              <a:rPr lang="en-US" b="1" dirty="0"/>
+              <a:t>: Group B</a:t>
+            </a:r>
+            <a:r>
+              <a:rPr lang="en-US" b="1" baseline="-25000" dirty="0"/>
+              <a:t>L</a:t>
+            </a:r>
+            <a:endParaRPr lang="en-US" b="1" dirty="0"/>
+          </a:p>
+          <a:p>
+            <a:endParaRPr lang="en-US" b="1" dirty="0"/>
+          </a:p>
+        </p:txBody>
+      </p:sp>
+      <p:sp>
+        <p:nvSpPr>
+          <p:cNvPr id="25" name="Rectangle 24"/>
+          <p:cNvSpPr/>
+          <p:nvPr/>
+        </p:nvSpPr>
+        <p:spPr>
+          <a:xfrm>
+            <a:off x="8816829" y="3557938"/>
+            <a:ext cx="159391" cy="435222"/>
+          </a:xfrm>
+          <a:prstGeom prst="rect">
+            <a:avLst/>
+          </a:prstGeom>
+          <a:solidFill>
+            <a:srgbClr val="ED7D31">
+              <a:alpha val="75000"/>
+            </a:srgbClr>
+          </a:solidFill>
+          <a:ln>
+            <a:noFill/>
+          </a:ln>
+        </p:spPr>
+        <p:style>
+          <a:lnRef idx="2">
+            <a:schemeClr val="accent1">
+              <a:shade val="50000"/>
+            </a:schemeClr>
+          </a:lnRef>
+          <a:fillRef idx="1">
+            <a:schemeClr val="accent1"/>
+          </a:fillRef>
+          <a:effectRef idx="0">
+            <a:schemeClr val="accent1"/>
+          </a:effectRef>
+          <a:fontRef idx="minor">
+            <a:schemeClr val="lt1"/>
+          </a:fontRef>
+        </p:style>
+        <p:txBody>
+          <a:bodyPr rtlCol="0" anchor="ctr"/>
+          <a:lstStyle/>
+          <a:p>
+            <a:pPr algn="ctr"/>
+            <a:endParaRPr lang="en-US"/>
+          </a:p>
+        </p:txBody>
+      </p:sp>
+      <p:sp>
+        <p:nvSpPr>
+          <p:cNvPr id="26" name="Rectangle 25"/>
+          <p:cNvSpPr/>
+          <p:nvPr/>
+        </p:nvSpPr>
+        <p:spPr>
+          <a:xfrm rot="5400000">
+            <a:off x="8563072" y="4476856"/>
+            <a:ext cx="129410" cy="318387"/>
+          </a:xfrm>
+          <a:prstGeom prst="rect">
+            <a:avLst/>
+          </a:prstGeom>
+          <a:solidFill>
+            <a:srgbClr val="ED7D31">
+              <a:alpha val="75000"/>
+            </a:srgbClr>
+          </a:solidFill>
+          <a:ln>
+            <a:noFill/>
+          </a:ln>
+        </p:spPr>
+        <p:style>
+          <a:lnRef idx="2">
+            <a:schemeClr val="accent1">
+              <a:shade val="50000"/>
+            </a:schemeClr>
+          </a:lnRef>
+          <a:fillRef idx="1">
+            <a:schemeClr val="accent1"/>
+          </a:fillRef>
+          <a:effectRef idx="0">
+            <a:schemeClr val="accent1"/>
+          </a:effectRef>
+          <a:fontRef idx="minor">
+            <a:schemeClr val="lt1"/>
+          </a:fontRef>
+        </p:style>
+        <p:txBody>
+          <a:bodyPr rtlCol="0" anchor="ctr"/>
+          <a:lstStyle/>
+          <a:p>
+            <a:pPr algn="ctr"/>
+            <a:endParaRPr lang="en-US"/>
+          </a:p>
+        </p:txBody>
+      </p:sp>
+      <p:sp>
+        <p:nvSpPr>
+          <p:cNvPr id="27" name="Rectangle 26"/>
+          <p:cNvSpPr/>
+          <p:nvPr/>
+        </p:nvSpPr>
+        <p:spPr>
+          <a:xfrm rot="5400000">
+            <a:off x="9157856" y="4474904"/>
+            <a:ext cx="129410" cy="318387"/>
+          </a:xfrm>
+          <a:prstGeom prst="rect">
+            <a:avLst/>
+          </a:prstGeom>
+          <a:solidFill>
+            <a:srgbClr val="ED7D31">
+              <a:alpha val="75000"/>
+            </a:srgbClr>
+          </a:solidFill>
+          <a:ln>
+            <a:noFill/>
+          </a:ln>
+        </p:spPr>
+        <p:style>
+          <a:lnRef idx="2">
+            <a:schemeClr val="accent1">
+              <a:shade val="50000"/>
+            </a:schemeClr>
+          </a:lnRef>
+          <a:fillRef idx="1">
+            <a:schemeClr val="accent1"/>
+          </a:fillRef>
+          <a:effectRef idx="0">
+            <a:schemeClr val="accent1"/>
+          </a:effectRef>
+          <a:fontRef idx="minor">
+            <a:schemeClr val="lt1"/>
+          </a:fontRef>
+        </p:style>
+        <p:txBody>
+          <a:bodyPr rtlCol="0" anchor="ctr"/>
+          <a:lstStyle/>
+          <a:p>
+            <a:pPr algn="ctr"/>
+            <a:endParaRPr lang="en-US"/>
+          </a:p>
+        </p:txBody>
+      </p:sp>
+      <p:sp>
+        <p:nvSpPr>
+          <p:cNvPr id="28" name="Rectangle 27"/>
+          <p:cNvSpPr/>
+          <p:nvPr/>
+        </p:nvSpPr>
+        <p:spPr>
+          <a:xfrm rot="5400000">
+            <a:off x="8561331" y="4344554"/>
+            <a:ext cx="129410" cy="318387"/>
+          </a:xfrm>
+          <a:prstGeom prst="rect">
+            <a:avLst/>
+          </a:prstGeom>
+          <a:solidFill>
+            <a:srgbClr val="ED7D31">
+              <a:alpha val="50000"/>
+            </a:srgbClr>
+          </a:solidFill>
+          <a:ln>
+            <a:noFill/>
+          </a:ln>
+        </p:spPr>
+        <p:style>
+          <a:lnRef idx="2">
+            <a:schemeClr val="accent1">
+              <a:shade val="50000"/>
+            </a:schemeClr>
+          </a:lnRef>
+          <a:fillRef idx="1">
+            <a:schemeClr val="accent1"/>
+          </a:fillRef>
+          <a:effectRef idx="0">
+            <a:schemeClr val="accent1"/>
+          </a:effectRef>
+          <a:fontRef idx="minor">
+            <a:schemeClr val="lt1"/>
+          </a:fontRef>
+        </p:style>
+        <p:txBody>
+          <a:bodyPr rtlCol="0" anchor="ctr"/>
+          <a:lstStyle/>
+          <a:p>
+            <a:pPr algn="ctr"/>
+            <a:endParaRPr lang="en-US"/>
+          </a:p>
+        </p:txBody>
+      </p:sp>
+      <p:sp>
+        <p:nvSpPr>
+          <p:cNvPr id="29" name="Rectangle 28"/>
+          <p:cNvSpPr/>
+          <p:nvPr/>
+        </p:nvSpPr>
+        <p:spPr>
+          <a:xfrm rot="5400000">
+            <a:off x="9156115" y="4342602"/>
+            <a:ext cx="129410" cy="318387"/>
+          </a:xfrm>
+          <a:prstGeom prst="rect">
+            <a:avLst/>
+          </a:prstGeom>
+          <a:solidFill>
+            <a:srgbClr val="ED7D31">
+              <a:alpha val="50000"/>
+            </a:srgbClr>
+          </a:solidFill>
+          <a:ln>
+            <a:noFill/>
+          </a:ln>
+        </p:spPr>
+        <p:style>
+          <a:lnRef idx="2">
+            <a:schemeClr val="accent1">
+              <a:shade val="50000"/>
+            </a:schemeClr>
+          </a:lnRef>
+          <a:fillRef idx="1">
+            <a:schemeClr val="accent1"/>
+          </a:fillRef>
+          <a:effectRef idx="0">
+            <a:schemeClr val="accent1"/>
+          </a:effectRef>
+          <a:fontRef idx="minor">
+            <a:schemeClr val="lt1"/>
+          </a:fontRef>
+        </p:style>
+        <p:txBody>
+          <a:bodyPr rtlCol="0" anchor="ctr"/>
+          <a:lstStyle/>
+          <a:p>
+            <a:pPr algn="ctr"/>
+            <a:endParaRPr lang="en-US"/>
+          </a:p>
+        </p:txBody>
+      </p:sp>
+      <p:sp>
+        <p:nvSpPr>
+          <p:cNvPr id="30" name="TextBox 29"/>
+          <p:cNvSpPr txBox="1"/>
+          <p:nvPr/>
+        </p:nvSpPr>
+        <p:spPr>
+          <a:xfrm>
+            <a:off x="4210566" y="4581609"/>
+            <a:ext cx="3063373" cy="646331"/>
+          </a:xfrm>
+          <a:prstGeom prst="rect">
+            <a:avLst/>
+          </a:prstGeom>
+          <a:noFill/>
+        </p:spPr>
+        <p:txBody>
+          <a:bodyPr wrap="square" rtlCol="0">
+            <a:spAutoFit/>
+          </a:bodyPr>
+          <a:lstStyle/>
+          <a:p>
+            <a:r>
+              <a:rPr lang="en-US" b="1" dirty="0"/>
+              <a:t>Ref/</a:t>
+            </a:r>
+            <a:r>
+              <a:rPr lang="en-US" b="1" dirty="0" err="1"/>
+              <a:t>Gnd</a:t>
+            </a:r>
+            <a:r>
+              <a:rPr lang="en-US" b="1" dirty="0"/>
+              <a:t>: Group B</a:t>
+            </a:r>
+            <a:r>
+              <a:rPr lang="en-US" b="1" baseline="-25000" dirty="0"/>
+              <a:t>R</a:t>
+            </a:r>
+            <a:endParaRPr lang="en-US" b="1" dirty="0"/>
+          </a:p>
+          <a:p>
+            <a:endParaRPr lang="en-US" b="1" dirty="0"/>
+          </a:p>
+        </p:txBody>
+      </p:sp>
+    </p:spTree>
+    <p:extLst>
+      <p:ext uri="{BB962C8B-B14F-4D97-AF65-F5344CB8AC3E}">
+        <p14:creationId xmlns:p14="http://schemas.microsoft.com/office/powerpoint/2010/main" val="829318684"/>
+      </p:ext>
+    </p:extLst>
+  </p:cSld>
+  <p:clrMapOvr>
+    <a:masterClrMapping/>
+  </p:clrMapOvr>
+</p:sld>
+</file>
+
+<file path=ppt/slides/slide9.xml><?xml version="1.0" encoding="utf-8"?>
 <p:sld xmlns:a="http://schemas.openxmlformats.org/drawingml/2006/main" xmlns:r="http://schemas.openxmlformats.org/officeDocument/2006/relationships" xmlns:p="http://schemas.openxmlformats.org/presentationml/2006/main">
   <p:cSld>
     <p:spTree>

</xml_diff>